<commit_message>
step of growing data & context
</commit_message>
<xml_diff>
--- a/AI - Prompt Patterns.pptx
+++ b/AI - Prompt Patterns.pptx
@@ -5,7 +5,7 @@
     <p:sldMasterId id="2147483648" r:id="rId1"/>
   </p:sldMasterIdLst>
   <p:notesMasterIdLst>
-    <p:notesMasterId r:id="rId12"/>
+    <p:notesMasterId r:id="rId13"/>
   </p:notesMasterIdLst>
   <p:sldIdLst>
     <p:sldId id="256" r:id="rId2"/>
@@ -18,6 +18,7 @@
     <p:sldId id="263" r:id="rId9"/>
     <p:sldId id="264" r:id="rId10"/>
     <p:sldId id="265" r:id="rId11"/>
+    <p:sldId id="266" r:id="rId12"/>
   </p:sldIdLst>
   <p:sldSz cx="12192000" cy="6858000"/>
   <p:notesSz cx="6858000" cy="9144000"/>
@@ -4778,6 +4779,821 @@
   <p:clrMapOvr>
     <a:masterClrMapping/>
   </p:clrMapOvr>
+</p:sld>
+</file>
+
+<file path=ppt/slides/slide11.xml><?xml version="1.0" encoding="utf-8"?>
+<p:sld xmlns:a="http://schemas.openxmlformats.org/drawingml/2006/main" xmlns:r="http://schemas.openxmlformats.org/officeDocument/2006/relationships" xmlns:p="http://schemas.openxmlformats.org/presentationml/2006/main">
+  <p:cSld>
+    <p:spTree>
+      <p:nvGrpSpPr>
+        <p:cNvPr id="1" name="">
+          <a:extLst>
+            <a:ext uri="{FF2B5EF4-FFF2-40B4-BE49-F238E27FC236}">
+              <a16:creationId xmlns:a16="http://schemas.microsoft.com/office/drawing/2014/main" id="{9176FB2D-9BED-A0C6-F6F1-8F1F0B8B0E3E}"/>
+            </a:ext>
+          </a:extLst>
+        </p:cNvPr>
+        <p:cNvGrpSpPr/>
+        <p:nvPr/>
+      </p:nvGrpSpPr>
+      <p:grpSpPr>
+        <a:xfrm>
+          <a:off x="0" y="0"/>
+          <a:ext cx="0" cy="0"/>
+          <a:chOff x="0" y="0"/>
+          <a:chExt cx="0" cy="0"/>
+        </a:xfrm>
+      </p:grpSpPr>
+      <p:sp>
+        <p:nvSpPr>
+          <p:cNvPr id="5" name="Striped Right Arrow 4">
+            <a:extLst>
+              <a:ext uri="{FF2B5EF4-FFF2-40B4-BE49-F238E27FC236}">
+                <a16:creationId xmlns:a16="http://schemas.microsoft.com/office/drawing/2014/main" id="{3241D9BC-5CFB-F52F-BA69-831C9CC8BA34}"/>
+              </a:ext>
+            </a:extLst>
+          </p:cNvPr>
+          <p:cNvSpPr/>
+          <p:nvPr/>
+        </p:nvSpPr>
+        <p:spPr>
+          <a:xfrm>
+            <a:off x="7109216" y="4667659"/>
+            <a:ext cx="367862" cy="1229711"/>
+          </a:xfrm>
+          <a:prstGeom prst="stripedRightArrow">
+            <a:avLst/>
+          </a:prstGeom>
+          <a:noFill/>
+        </p:spPr>
+        <p:style>
+          <a:lnRef idx="2">
+            <a:schemeClr val="accent1">
+              <a:shade val="15000"/>
+            </a:schemeClr>
+          </a:lnRef>
+          <a:fillRef idx="1">
+            <a:schemeClr val="accent1"/>
+          </a:fillRef>
+          <a:effectRef idx="0">
+            <a:schemeClr val="accent1"/>
+          </a:effectRef>
+          <a:fontRef idx="minor">
+            <a:schemeClr val="lt1"/>
+          </a:fontRef>
+        </p:style>
+        <p:txBody>
+          <a:bodyPr rtlCol="0" anchor="ctr"/>
+          <a:lstStyle/>
+          <a:p>
+            <a:pPr algn="ctr"/>
+            <a:endParaRPr lang="en-US">
+              <a:solidFill>
+                <a:schemeClr val="tx1"/>
+              </a:solidFill>
+            </a:endParaRPr>
+          </a:p>
+        </p:txBody>
+      </p:sp>
+      <p:sp>
+        <p:nvSpPr>
+          <p:cNvPr id="7" name="16-Point Star 6">
+            <a:extLst>
+              <a:ext uri="{FF2B5EF4-FFF2-40B4-BE49-F238E27FC236}">
+                <a16:creationId xmlns:a16="http://schemas.microsoft.com/office/drawing/2014/main" id="{E3971857-2DFF-4657-2913-054901B1406F}"/>
+              </a:ext>
+            </a:extLst>
+          </p:cNvPr>
+          <p:cNvSpPr/>
+          <p:nvPr/>
+        </p:nvSpPr>
+        <p:spPr>
+          <a:xfrm>
+            <a:off x="7663638" y="4720994"/>
+            <a:ext cx="1176376" cy="1176376"/>
+          </a:xfrm>
+          <a:prstGeom prst="star16">
+            <a:avLst/>
+          </a:prstGeom>
+          <a:noFill/>
+        </p:spPr>
+        <p:style>
+          <a:lnRef idx="2">
+            <a:schemeClr val="accent1">
+              <a:shade val="15000"/>
+            </a:schemeClr>
+          </a:lnRef>
+          <a:fillRef idx="1">
+            <a:schemeClr val="accent1"/>
+          </a:fillRef>
+          <a:effectRef idx="0">
+            <a:schemeClr val="accent1"/>
+          </a:effectRef>
+          <a:fontRef idx="minor">
+            <a:schemeClr val="lt1"/>
+          </a:fontRef>
+        </p:style>
+        <p:txBody>
+          <a:bodyPr rtlCol="0" anchor="ctr"/>
+          <a:lstStyle/>
+          <a:p>
+            <a:pPr algn="ctr"/>
+            <a:r>
+              <a:rPr lang="en-US" sz="1200" dirty="0">
+                <a:solidFill>
+                  <a:schemeClr val="tx1"/>
+                </a:solidFill>
+              </a:rPr>
+              <a:t>Final Result</a:t>
+            </a:r>
+          </a:p>
+        </p:txBody>
+      </p:sp>
+      <p:grpSp>
+        <p:nvGrpSpPr>
+          <p:cNvPr id="9" name="Group 8">
+            <a:extLst>
+              <a:ext uri="{FF2B5EF4-FFF2-40B4-BE49-F238E27FC236}">
+                <a16:creationId xmlns:a16="http://schemas.microsoft.com/office/drawing/2014/main" id="{2B5C605E-B521-E004-009D-28464DCD1D03}"/>
+              </a:ext>
+            </a:extLst>
+          </p:cNvPr>
+          <p:cNvGrpSpPr/>
+          <p:nvPr/>
+        </p:nvGrpSpPr>
+        <p:grpSpPr>
+          <a:xfrm>
+            <a:off x="272926" y="336118"/>
+            <a:ext cx="2946464" cy="2478027"/>
+            <a:chOff x="1597572" y="662152"/>
+            <a:chExt cx="6611008" cy="5559972"/>
+          </a:xfrm>
+        </p:grpSpPr>
+        <p:sp>
+          <p:nvSpPr>
+            <p:cNvPr id="4" name="Rectangle 3">
+              <a:extLst>
+                <a:ext uri="{FF2B5EF4-FFF2-40B4-BE49-F238E27FC236}">
+                  <a16:creationId xmlns:a16="http://schemas.microsoft.com/office/drawing/2014/main" id="{F539C165-2EAE-10E4-A679-3479A164CE0D}"/>
+                </a:ext>
+              </a:extLst>
+            </p:cNvPr>
+            <p:cNvSpPr/>
+            <p:nvPr/>
+          </p:nvSpPr>
+          <p:spPr>
+            <a:xfrm>
+              <a:off x="1597572" y="662152"/>
+              <a:ext cx="6611008" cy="5559972"/>
+            </a:xfrm>
+            <a:prstGeom prst="rect">
+              <a:avLst/>
+            </a:prstGeom>
+            <a:noFill/>
+          </p:spPr>
+          <p:style>
+            <a:lnRef idx="2">
+              <a:schemeClr val="accent1">
+                <a:shade val="15000"/>
+              </a:schemeClr>
+            </a:lnRef>
+            <a:fillRef idx="1">
+              <a:schemeClr val="accent1"/>
+            </a:fillRef>
+            <a:effectRef idx="0">
+              <a:schemeClr val="accent1"/>
+            </a:effectRef>
+            <a:fontRef idx="minor">
+              <a:schemeClr val="lt1"/>
+            </a:fontRef>
+          </p:style>
+          <p:txBody>
+            <a:bodyPr rtlCol="0" anchor="ctr"/>
+            <a:lstStyle/>
+            <a:p>
+              <a:pPr algn="just"/>
+              <a:r>
+                <a:rPr lang="en-US" sz="1100" dirty="0">
+                  <a:solidFill>
+                    <a:schemeClr val="tx1"/>
+                  </a:solidFill>
+                </a:rPr>
+                <a:t>Prompt</a:t>
+              </a:r>
+            </a:p>
+          </p:txBody>
+        </p:sp>
+        <p:sp>
+          <p:nvSpPr>
+            <p:cNvPr id="2" name="Rectangle 1">
+              <a:extLst>
+                <a:ext uri="{FF2B5EF4-FFF2-40B4-BE49-F238E27FC236}">
+                  <a16:creationId xmlns:a16="http://schemas.microsoft.com/office/drawing/2014/main" id="{3F17B514-BE35-6EC3-8835-BAAFCACC27B2}"/>
+                </a:ext>
+              </a:extLst>
+            </p:cNvPr>
+            <p:cNvSpPr/>
+            <p:nvPr/>
+          </p:nvSpPr>
+          <p:spPr>
+            <a:xfrm>
+              <a:off x="7057066" y="872358"/>
+              <a:ext cx="964954" cy="5139557"/>
+            </a:xfrm>
+            <a:prstGeom prst="rect">
+              <a:avLst/>
+            </a:prstGeom>
+            <a:solidFill>
+              <a:schemeClr val="bg1">
+                <a:lumMod val="85000"/>
+              </a:schemeClr>
+            </a:solidFill>
+          </p:spPr>
+          <p:style>
+            <a:lnRef idx="2">
+              <a:schemeClr val="accent1">
+                <a:shade val="15000"/>
+              </a:schemeClr>
+            </a:lnRef>
+            <a:fillRef idx="1">
+              <a:schemeClr val="accent1"/>
+            </a:fillRef>
+            <a:effectRef idx="0">
+              <a:schemeClr val="accent1"/>
+            </a:effectRef>
+            <a:fontRef idx="minor">
+              <a:schemeClr val="lt1"/>
+            </a:fontRef>
+          </p:style>
+          <p:txBody>
+            <a:bodyPr rtlCol="0" anchor="ctr"/>
+            <a:lstStyle/>
+            <a:p>
+              <a:pPr algn="just"/>
+              <a:r>
+                <a:rPr lang="en-US" sz="1100" dirty="0">
+                  <a:solidFill>
+                    <a:schemeClr val="tx1"/>
+                  </a:solidFill>
+                </a:rPr>
+                <a:t>Impromptu prompt</a:t>
+              </a:r>
+            </a:p>
+          </p:txBody>
+        </p:sp>
+        <p:sp>
+          <p:nvSpPr>
+            <p:cNvPr id="3" name="Rectangle 2">
+              <a:extLst>
+                <a:ext uri="{FF2B5EF4-FFF2-40B4-BE49-F238E27FC236}">
+                  <a16:creationId xmlns:a16="http://schemas.microsoft.com/office/drawing/2014/main" id="{6401AEEB-E658-3A66-4C18-647D0428C424}"/>
+                </a:ext>
+              </a:extLst>
+            </p:cNvPr>
+            <p:cNvSpPr/>
+            <p:nvPr/>
+          </p:nvSpPr>
+          <p:spPr>
+            <a:xfrm>
+              <a:off x="1732433" y="872359"/>
+              <a:ext cx="4779578" cy="375817"/>
+            </a:xfrm>
+            <a:prstGeom prst="rect">
+              <a:avLst/>
+            </a:prstGeom>
+            <a:solidFill>
+              <a:schemeClr val="bg1">
+                <a:lumMod val="85000"/>
+              </a:schemeClr>
+            </a:solidFill>
+          </p:spPr>
+          <p:style>
+            <a:lnRef idx="2">
+              <a:schemeClr val="accent1">
+                <a:shade val="15000"/>
+              </a:schemeClr>
+            </a:lnRef>
+            <a:fillRef idx="1">
+              <a:schemeClr val="accent1"/>
+            </a:fillRef>
+            <a:effectRef idx="0">
+              <a:schemeClr val="accent1"/>
+            </a:effectRef>
+            <a:fontRef idx="minor">
+              <a:schemeClr val="lt1"/>
+            </a:fontRef>
+          </p:style>
+          <p:txBody>
+            <a:bodyPr rtlCol="0" anchor="ctr"/>
+            <a:lstStyle/>
+            <a:p>
+              <a:pPr algn="just"/>
+              <a:r>
+                <a:rPr lang="en-US" sz="1100" dirty="0">
+                  <a:solidFill>
+                    <a:schemeClr val="tx1"/>
+                  </a:solidFill>
+                </a:rPr>
+                <a:t>examples</a:t>
+              </a:r>
+            </a:p>
+          </p:txBody>
+        </p:sp>
+        <p:sp>
+          <p:nvSpPr>
+            <p:cNvPr id="6" name="Rectangle 5">
+              <a:extLst>
+                <a:ext uri="{FF2B5EF4-FFF2-40B4-BE49-F238E27FC236}">
+                  <a16:creationId xmlns:a16="http://schemas.microsoft.com/office/drawing/2014/main" id="{F98A678E-2BE2-F95B-0167-1EAB70FBC58B}"/>
+                </a:ext>
+              </a:extLst>
+            </p:cNvPr>
+            <p:cNvSpPr/>
+            <p:nvPr/>
+          </p:nvSpPr>
+          <p:spPr>
+            <a:xfrm>
+              <a:off x="4903076" y="1622365"/>
+              <a:ext cx="1608935" cy="1740607"/>
+            </a:xfrm>
+            <a:prstGeom prst="rect">
+              <a:avLst/>
+            </a:prstGeom>
+            <a:noFill/>
+            <a:ln>
+              <a:solidFill>
+                <a:schemeClr val="bg1">
+                  <a:lumMod val="75000"/>
+                </a:schemeClr>
+              </a:solidFill>
+              <a:prstDash val="sysDot"/>
+            </a:ln>
+          </p:spPr>
+          <p:style>
+            <a:lnRef idx="2">
+              <a:schemeClr val="accent1">
+                <a:shade val="15000"/>
+              </a:schemeClr>
+            </a:lnRef>
+            <a:fillRef idx="1">
+              <a:schemeClr val="accent1"/>
+            </a:fillRef>
+            <a:effectRef idx="0">
+              <a:schemeClr val="accent1"/>
+            </a:effectRef>
+            <a:fontRef idx="minor">
+              <a:schemeClr val="lt1"/>
+            </a:fontRef>
+          </p:style>
+          <p:txBody>
+            <a:bodyPr rtlCol="0" anchor="ctr"/>
+            <a:lstStyle/>
+            <a:p>
+              <a:pPr algn="just"/>
+              <a:r>
+                <a:rPr lang="en-US" sz="1100" dirty="0">
+                  <a:ln>
+                    <a:solidFill>
+                      <a:schemeClr val="bg1">
+                        <a:lumMod val="75000"/>
+                      </a:schemeClr>
+                    </a:solidFill>
+                  </a:ln>
+                  <a:solidFill>
+                    <a:schemeClr val="tx1"/>
+                  </a:solidFill>
+                </a:rPr>
+                <a:t>Data / Context</a:t>
+              </a:r>
+            </a:p>
+          </p:txBody>
+        </p:sp>
+        <p:sp>
+          <p:nvSpPr>
+            <p:cNvPr id="8" name="Rectangle 7">
+              <a:extLst>
+                <a:ext uri="{FF2B5EF4-FFF2-40B4-BE49-F238E27FC236}">
+                  <a16:creationId xmlns:a16="http://schemas.microsoft.com/office/drawing/2014/main" id="{7500E761-1E95-8357-E242-C24EF954A90D}"/>
+                </a:ext>
+              </a:extLst>
+            </p:cNvPr>
+            <p:cNvSpPr/>
+            <p:nvPr/>
+          </p:nvSpPr>
+          <p:spPr>
+            <a:xfrm>
+              <a:off x="1828800" y="3595423"/>
+              <a:ext cx="5019372" cy="2492696"/>
+            </a:xfrm>
+            <a:prstGeom prst="rect">
+              <a:avLst/>
+            </a:prstGeom>
+            <a:solidFill>
+              <a:schemeClr val="bg1">
+                <a:lumMod val="85000"/>
+              </a:schemeClr>
+            </a:solidFill>
+          </p:spPr>
+          <p:style>
+            <a:lnRef idx="2">
+              <a:schemeClr val="accent1">
+                <a:shade val="15000"/>
+              </a:schemeClr>
+            </a:lnRef>
+            <a:fillRef idx="1">
+              <a:schemeClr val="accent1"/>
+            </a:fillRef>
+            <a:effectRef idx="0">
+              <a:schemeClr val="accent1"/>
+            </a:effectRef>
+            <a:fontRef idx="minor">
+              <a:schemeClr val="lt1"/>
+            </a:fontRef>
+          </p:style>
+          <p:txBody>
+            <a:bodyPr rtlCol="0" anchor="ctr"/>
+            <a:lstStyle/>
+            <a:p>
+              <a:pPr algn="just"/>
+              <a:r>
+                <a:rPr lang="en-US" sz="1100" dirty="0">
+                  <a:solidFill>
+                    <a:schemeClr val="tx1"/>
+                  </a:solidFill>
+                </a:rPr>
+                <a:t>process</a:t>
+              </a:r>
+            </a:p>
+          </p:txBody>
+        </p:sp>
+      </p:grpSp>
+      <p:sp>
+        <p:nvSpPr>
+          <p:cNvPr id="10" name="Striped Right Arrow 9">
+            <a:extLst>
+              <a:ext uri="{FF2B5EF4-FFF2-40B4-BE49-F238E27FC236}">
+                <a16:creationId xmlns:a16="http://schemas.microsoft.com/office/drawing/2014/main" id="{759101CC-EA41-070A-B548-0E46BEFE1446}"/>
+              </a:ext>
+            </a:extLst>
+          </p:cNvPr>
+          <p:cNvSpPr/>
+          <p:nvPr/>
+        </p:nvSpPr>
+        <p:spPr>
+          <a:xfrm>
+            <a:off x="3462316" y="513554"/>
+            <a:ext cx="367862" cy="1229711"/>
+          </a:xfrm>
+          <a:prstGeom prst="stripedRightArrow">
+            <a:avLst/>
+          </a:prstGeom>
+          <a:noFill/>
+        </p:spPr>
+        <p:style>
+          <a:lnRef idx="2">
+            <a:schemeClr val="accent1">
+              <a:shade val="15000"/>
+            </a:schemeClr>
+          </a:lnRef>
+          <a:fillRef idx="1">
+            <a:schemeClr val="accent1"/>
+          </a:fillRef>
+          <a:effectRef idx="0">
+            <a:schemeClr val="accent1"/>
+          </a:effectRef>
+          <a:fontRef idx="minor">
+            <a:schemeClr val="lt1"/>
+          </a:fontRef>
+        </p:style>
+        <p:txBody>
+          <a:bodyPr rtlCol="0" anchor="ctr"/>
+          <a:lstStyle/>
+          <a:p>
+            <a:pPr algn="ctr"/>
+            <a:endParaRPr lang="en-US">
+              <a:solidFill>
+                <a:schemeClr val="tx1"/>
+              </a:solidFill>
+            </a:endParaRPr>
+          </a:p>
+        </p:txBody>
+      </p:sp>
+      <p:sp>
+        <p:nvSpPr>
+          <p:cNvPr id="11" name="Rectangle 10">
+            <a:extLst>
+              <a:ext uri="{FF2B5EF4-FFF2-40B4-BE49-F238E27FC236}">
+                <a16:creationId xmlns:a16="http://schemas.microsoft.com/office/drawing/2014/main" id="{C4404511-BC27-1C87-B087-2B2983FE0820}"/>
+              </a:ext>
+            </a:extLst>
+          </p:cNvPr>
+          <p:cNvSpPr/>
+          <p:nvPr/>
+        </p:nvSpPr>
+        <p:spPr>
+          <a:xfrm>
+            <a:off x="4287489" y="815119"/>
+            <a:ext cx="506933" cy="358774"/>
+          </a:xfrm>
+          <a:prstGeom prst="rect">
+            <a:avLst/>
+          </a:prstGeom>
+          <a:noFill/>
+        </p:spPr>
+        <p:style>
+          <a:lnRef idx="2">
+            <a:schemeClr val="accent1">
+              <a:shade val="15000"/>
+            </a:schemeClr>
+          </a:lnRef>
+          <a:fillRef idx="1">
+            <a:schemeClr val="accent1"/>
+          </a:fillRef>
+          <a:effectRef idx="0">
+            <a:schemeClr val="accent1"/>
+          </a:effectRef>
+          <a:fontRef idx="minor">
+            <a:schemeClr val="lt1"/>
+          </a:fontRef>
+        </p:style>
+        <p:txBody>
+          <a:bodyPr rtlCol="0" anchor="ctr"/>
+          <a:lstStyle/>
+          <a:p>
+            <a:pPr algn="just"/>
+            <a:r>
+              <a:rPr lang="en-US" sz="600" dirty="0">
+                <a:solidFill>
+                  <a:schemeClr val="tx1"/>
+                </a:solidFill>
+              </a:rPr>
+              <a:t>Data / Context</a:t>
+            </a:r>
+          </a:p>
+        </p:txBody>
+      </p:sp>
+      <p:pic>
+        <p:nvPicPr>
+          <p:cNvPr id="12" name="Picture 11">
+            <a:extLst>
+              <a:ext uri="{FF2B5EF4-FFF2-40B4-BE49-F238E27FC236}">
+                <a16:creationId xmlns:a16="http://schemas.microsoft.com/office/drawing/2014/main" id="{36084B57-5233-B4CD-4604-EFCD6C5D9E63}"/>
+              </a:ext>
+            </a:extLst>
+          </p:cNvPr>
+          <p:cNvPicPr>
+            <a:picLocks noChangeAspect="1"/>
+          </p:cNvPicPr>
+          <p:nvPr/>
+        </p:nvPicPr>
+        <p:blipFill>
+          <a:blip r:embed="rId2"/>
+          <a:srcRect r="17656" b="33733"/>
+          <a:stretch/>
+        </p:blipFill>
+        <p:spPr>
+          <a:xfrm>
+            <a:off x="4896490" y="597303"/>
+            <a:ext cx="1296751" cy="1279222"/>
+          </a:xfrm>
+          <a:prstGeom prst="rect">
+            <a:avLst/>
+          </a:prstGeom>
+        </p:spPr>
+      </p:pic>
+      <p:sp>
+        <p:nvSpPr>
+          <p:cNvPr id="13" name="Striped Right Arrow 12">
+            <a:extLst>
+              <a:ext uri="{FF2B5EF4-FFF2-40B4-BE49-F238E27FC236}">
+                <a16:creationId xmlns:a16="http://schemas.microsoft.com/office/drawing/2014/main" id="{67E1144A-63BB-8BA7-AC83-50EC05F5CA9D}"/>
+              </a:ext>
+            </a:extLst>
+          </p:cNvPr>
+          <p:cNvSpPr/>
+          <p:nvPr/>
+        </p:nvSpPr>
+        <p:spPr>
+          <a:xfrm rot="5400000">
+            <a:off x="5124278" y="3245070"/>
+            <a:ext cx="367862" cy="1229711"/>
+          </a:xfrm>
+          <a:prstGeom prst="stripedRightArrow">
+            <a:avLst/>
+          </a:prstGeom>
+          <a:noFill/>
+        </p:spPr>
+        <p:style>
+          <a:lnRef idx="2">
+            <a:schemeClr val="accent1">
+              <a:shade val="15000"/>
+            </a:schemeClr>
+          </a:lnRef>
+          <a:fillRef idx="1">
+            <a:schemeClr val="accent1"/>
+          </a:fillRef>
+          <a:effectRef idx="0">
+            <a:schemeClr val="accent1"/>
+          </a:effectRef>
+          <a:fontRef idx="minor">
+            <a:schemeClr val="lt1"/>
+          </a:fontRef>
+        </p:style>
+        <p:txBody>
+          <a:bodyPr rtlCol="0" anchor="ctr"/>
+          <a:lstStyle/>
+          <a:p>
+            <a:pPr algn="ctr"/>
+            <a:endParaRPr lang="en-US">
+              <a:solidFill>
+                <a:schemeClr val="tx1"/>
+              </a:solidFill>
+            </a:endParaRPr>
+          </a:p>
+        </p:txBody>
+      </p:sp>
+      <p:sp>
+        <p:nvSpPr>
+          <p:cNvPr id="17" name="Rectangle 16">
+            <a:extLst>
+              <a:ext uri="{FF2B5EF4-FFF2-40B4-BE49-F238E27FC236}">
+                <a16:creationId xmlns:a16="http://schemas.microsoft.com/office/drawing/2014/main" id="{ACA18150-9C84-0FEA-81BE-B979F51357E7}"/>
+              </a:ext>
+            </a:extLst>
+          </p:cNvPr>
+          <p:cNvSpPr/>
+          <p:nvPr/>
+        </p:nvSpPr>
+        <p:spPr>
+          <a:xfrm>
+            <a:off x="4287487" y="2634758"/>
+            <a:ext cx="1075345" cy="794242"/>
+          </a:xfrm>
+          <a:prstGeom prst="rect">
+            <a:avLst/>
+          </a:prstGeom>
+          <a:noFill/>
+        </p:spPr>
+        <p:style>
+          <a:lnRef idx="2">
+            <a:schemeClr val="accent1">
+              <a:shade val="15000"/>
+            </a:schemeClr>
+          </a:lnRef>
+          <a:fillRef idx="1">
+            <a:schemeClr val="accent1"/>
+          </a:fillRef>
+          <a:effectRef idx="0">
+            <a:schemeClr val="accent1"/>
+          </a:effectRef>
+          <a:fontRef idx="minor">
+            <a:schemeClr val="lt1"/>
+          </a:fontRef>
+        </p:style>
+        <p:txBody>
+          <a:bodyPr rtlCol="0" anchor="ctr"/>
+          <a:lstStyle/>
+          <a:p>
+            <a:pPr algn="just"/>
+            <a:r>
+              <a:rPr lang="en-US" sz="800" dirty="0">
+                <a:solidFill>
+                  <a:schemeClr val="tx1"/>
+                </a:solidFill>
+              </a:rPr>
+              <a:t>Data / Context</a:t>
+            </a:r>
+          </a:p>
+        </p:txBody>
+      </p:sp>
+      <p:sp>
+        <p:nvSpPr>
+          <p:cNvPr id="18" name="Striped Right Arrow 17">
+            <a:extLst>
+              <a:ext uri="{FF2B5EF4-FFF2-40B4-BE49-F238E27FC236}">
+                <a16:creationId xmlns:a16="http://schemas.microsoft.com/office/drawing/2014/main" id="{F23FDD8D-A93A-CAA9-C07B-00817F37B828}"/>
+              </a:ext>
+            </a:extLst>
+          </p:cNvPr>
+          <p:cNvSpPr/>
+          <p:nvPr/>
+        </p:nvSpPr>
+        <p:spPr>
+          <a:xfrm rot="5400000">
+            <a:off x="5124279" y="1736479"/>
+            <a:ext cx="367862" cy="1229711"/>
+          </a:xfrm>
+          <a:prstGeom prst="stripedRightArrow">
+            <a:avLst/>
+          </a:prstGeom>
+          <a:noFill/>
+        </p:spPr>
+        <p:style>
+          <a:lnRef idx="2">
+            <a:schemeClr val="accent1">
+              <a:shade val="15000"/>
+            </a:schemeClr>
+          </a:lnRef>
+          <a:fillRef idx="1">
+            <a:schemeClr val="accent1"/>
+          </a:fillRef>
+          <a:effectRef idx="0">
+            <a:schemeClr val="accent1"/>
+          </a:effectRef>
+          <a:fontRef idx="minor">
+            <a:schemeClr val="lt1"/>
+          </a:fontRef>
+        </p:style>
+        <p:txBody>
+          <a:bodyPr rtlCol="0" anchor="ctr"/>
+          <a:lstStyle/>
+          <a:p>
+            <a:pPr algn="ctr"/>
+            <a:endParaRPr lang="en-US">
+              <a:solidFill>
+                <a:schemeClr val="tx1"/>
+              </a:solidFill>
+            </a:endParaRPr>
+          </a:p>
+        </p:txBody>
+      </p:sp>
+      <p:sp>
+        <p:nvSpPr>
+          <p:cNvPr id="19" name="Rectangle 18">
+            <a:extLst>
+              <a:ext uri="{FF2B5EF4-FFF2-40B4-BE49-F238E27FC236}">
+                <a16:creationId xmlns:a16="http://schemas.microsoft.com/office/drawing/2014/main" id="{D2E0DC3C-E3C3-5DD7-4A72-22EB61C20B56}"/>
+              </a:ext>
+            </a:extLst>
+          </p:cNvPr>
+          <p:cNvSpPr/>
+          <p:nvPr/>
+        </p:nvSpPr>
+        <p:spPr>
+          <a:xfrm>
+            <a:off x="4287486" y="4387147"/>
+            <a:ext cx="2446946" cy="1655734"/>
+          </a:xfrm>
+          <a:prstGeom prst="rect">
+            <a:avLst/>
+          </a:prstGeom>
+          <a:noFill/>
+        </p:spPr>
+        <p:style>
+          <a:lnRef idx="2">
+            <a:schemeClr val="accent1">
+              <a:shade val="15000"/>
+            </a:schemeClr>
+          </a:lnRef>
+          <a:fillRef idx="1">
+            <a:schemeClr val="accent1"/>
+          </a:fillRef>
+          <a:effectRef idx="0">
+            <a:schemeClr val="accent1"/>
+          </a:effectRef>
+          <a:fontRef idx="minor">
+            <a:schemeClr val="lt1"/>
+          </a:fontRef>
+        </p:style>
+        <p:txBody>
+          <a:bodyPr rtlCol="0" anchor="ctr"/>
+          <a:lstStyle/>
+          <a:p>
+            <a:pPr algn="just"/>
+            <a:r>
+              <a:rPr lang="en-US" sz="2400" dirty="0">
+                <a:solidFill>
+                  <a:schemeClr val="tx1"/>
+                </a:solidFill>
+              </a:rPr>
+              <a:t>Data / Context</a:t>
+            </a:r>
+          </a:p>
+        </p:txBody>
+      </p:sp>
+    </p:spTree>
+    <p:extLst>
+      <p:ext uri="{BB962C8B-B14F-4D97-AF65-F5344CB8AC3E}">
+        <p14:creationId xmlns:p14="http://schemas.microsoft.com/office/powerpoint/2010/main" val="978358348"/>
+      </p:ext>
+    </p:extLst>
+  </p:cSld>
+  <p:clrMapOvr>
+    <a:masterClrMapping/>
+  </p:clrMapOvr>
+  <mc:AlternateContent xmlns:mc="http://schemas.openxmlformats.org/markup-compatibility/2006">
+    <mc:Choice xmlns:p159="http://schemas.microsoft.com/office/powerpoint/2015/09/main" Requires="p159">
+      <p:transition xmlns:p14="http://schemas.microsoft.com/office/powerpoint/2010/main" spd="slow" p14:dur="2000">
+        <p159:morph option="byObject"/>
+      </p:transition>
+    </mc:Choice>
+    <mc:Fallback>
+      <p:transition spd="slow">
+        <p:fade/>
+      </p:transition>
+    </mc:Fallback>
+  </mc:AlternateContent>
 </p:sld>
 </file>
 

</xml_diff>